<commit_message>
November 15 codes & slides
</commit_message>
<xml_diff>
--- a/Slides/5.KRY-ANLP_15Kasim.pptx
+++ b/Slides/5.KRY-ANLP_15Kasim.pptx
@@ -5,7 +5,7 @@
     <p:sldMasterId id="2147483648" r:id="rId1"/>
   </p:sldMasterIdLst>
   <p:notesMasterIdLst>
-    <p:notesMasterId r:id="rId8"/>
+    <p:notesMasterId r:id="rId9"/>
   </p:notesMasterIdLst>
   <p:sldIdLst>
     <p:sldId id="405" r:id="rId2"/>
@@ -13,7 +13,8 @@
     <p:sldId id="423" r:id="rId4"/>
     <p:sldId id="424" r:id="rId5"/>
     <p:sldId id="425" r:id="rId6"/>
-    <p:sldId id="422" r:id="rId7"/>
+    <p:sldId id="426" r:id="rId7"/>
+    <p:sldId id="422" r:id="rId8"/>
   </p:sldIdLst>
   <p:sldSz cx="12192000" cy="6858000"/>
   <p:notesSz cx="6858000" cy="9144000"/>
@@ -202,7 +203,7 @@
           <a:p>
             <a:fld id="{CDF7A3D4-56E4-4B41-920A-4207B7313A59}" type="datetimeFigureOut">
               <a:rPr lang="en-TR" smtClean="0"/>
-              <a:t>13.11.2023</a:t>
+              <a:t>14.11.2023</a:t>
             </a:fld>
             <a:endParaRPr lang="en-TR"/>
           </a:p>
@@ -968,6 +969,90 @@
     </p:spTree>
     <p:extLst>
       <p:ext uri="{BB962C8B-B14F-4D97-AF65-F5344CB8AC3E}">
+        <p14:creationId xmlns:p14="http://schemas.microsoft.com/office/powerpoint/2010/main" val="84355519"/>
+      </p:ext>
+    </p:extLst>
+  </p:cSld>
+  <p:clrMapOvr>
+    <a:masterClrMapping/>
+  </p:clrMapOvr>
+</p:notes>
+</file>
+
+<file path=ppt/notesSlides/notesSlide7.xml><?xml version="1.0" encoding="utf-8"?>
+<p:notes xmlns:a="http://schemas.openxmlformats.org/drawingml/2006/main" xmlns:r="http://schemas.openxmlformats.org/officeDocument/2006/relationships" xmlns:p="http://schemas.openxmlformats.org/presentationml/2006/main">
+  <p:cSld>
+    <p:spTree>
+      <p:nvGrpSpPr>
+        <p:cNvPr id="1" name=""/>
+        <p:cNvGrpSpPr/>
+        <p:nvPr/>
+      </p:nvGrpSpPr>
+      <p:grpSpPr>
+        <a:xfrm>
+          <a:off x="0" y="0"/>
+          <a:ext cx="0" cy="0"/>
+          <a:chOff x="0" y="0"/>
+          <a:chExt cx="0" cy="0"/>
+        </a:xfrm>
+      </p:grpSpPr>
+      <p:sp>
+        <p:nvSpPr>
+          <p:cNvPr id="2" name="Slide Image Placeholder 1"/>
+          <p:cNvSpPr>
+            <a:spLocks noGrp="1" noRot="1" noChangeAspect="1"/>
+          </p:cNvSpPr>
+          <p:nvPr>
+            <p:ph type="sldImg"/>
+          </p:nvPr>
+        </p:nvSpPr>
+        <p:spPr/>
+      </p:sp>
+      <p:sp>
+        <p:nvSpPr>
+          <p:cNvPr id="3" name="Notes Placeholder 2"/>
+          <p:cNvSpPr>
+            <a:spLocks noGrp="1"/>
+          </p:cNvSpPr>
+          <p:nvPr>
+            <p:ph type="body" idx="1"/>
+          </p:nvPr>
+        </p:nvSpPr>
+        <p:spPr/>
+        <p:txBody>
+          <a:bodyPr/>
+          <a:lstStyle/>
+          <a:p>
+            <a:endParaRPr lang="en-US"/>
+          </a:p>
+        </p:txBody>
+      </p:sp>
+      <p:sp>
+        <p:nvSpPr>
+          <p:cNvPr id="4" name="Slide Number Placeholder 3"/>
+          <p:cNvSpPr>
+            <a:spLocks noGrp="1"/>
+          </p:cNvSpPr>
+          <p:nvPr>
+            <p:ph type="sldNum" sz="quarter" idx="10"/>
+          </p:nvPr>
+        </p:nvSpPr>
+        <p:spPr/>
+        <p:txBody>
+          <a:bodyPr/>
+          <a:lstStyle/>
+          <a:p>
+            <a:fld id="{78DB07BF-2576-D140-9F34-ADCACCA99E93}" type="slidenum">
+              <a:rPr lang="en-US" smtClean="0"/>
+              <a:t>7</a:t>
+            </a:fld>
+            <a:endParaRPr lang="en-US"/>
+          </a:p>
+        </p:txBody>
+      </p:sp>
+    </p:spTree>
+    <p:extLst>
+      <p:ext uri="{BB962C8B-B14F-4D97-AF65-F5344CB8AC3E}">
         <p14:creationId xmlns:p14="http://schemas.microsoft.com/office/powerpoint/2010/main" val="1348530801"/>
       </p:ext>
     </p:extLst>
@@ -1127,7 +1212,7 @@
           <a:p>
             <a:fld id="{9103C8AC-F847-6148-BF1E-A1B65C7CDFC8}" type="datetimeFigureOut">
               <a:rPr lang="en-TR" smtClean="0"/>
-              <a:t>13.11.2023</a:t>
+              <a:t>14.11.2023</a:t>
             </a:fld>
             <a:endParaRPr lang="en-TR"/>
           </a:p>
@@ -1327,7 +1412,7 @@
           <a:p>
             <a:fld id="{9103C8AC-F847-6148-BF1E-A1B65C7CDFC8}" type="datetimeFigureOut">
               <a:rPr lang="en-TR" smtClean="0"/>
-              <a:t>13.11.2023</a:t>
+              <a:t>14.11.2023</a:t>
             </a:fld>
             <a:endParaRPr lang="en-TR"/>
           </a:p>
@@ -1537,7 +1622,7 @@
           <a:p>
             <a:fld id="{9103C8AC-F847-6148-BF1E-A1B65C7CDFC8}" type="datetimeFigureOut">
               <a:rPr lang="en-TR" smtClean="0"/>
-              <a:t>13.11.2023</a:t>
+              <a:t>14.11.2023</a:t>
             </a:fld>
             <a:endParaRPr lang="en-TR"/>
           </a:p>
@@ -2067,7 +2152,7 @@
           <a:p>
             <a:fld id="{9103C8AC-F847-6148-BF1E-A1B65C7CDFC8}" type="datetimeFigureOut">
               <a:rPr lang="en-TR" smtClean="0"/>
-              <a:t>13.11.2023</a:t>
+              <a:t>14.11.2023</a:t>
             </a:fld>
             <a:endParaRPr lang="en-TR"/>
           </a:p>
@@ -2343,7 +2428,7 @@
           <a:p>
             <a:fld id="{9103C8AC-F847-6148-BF1E-A1B65C7CDFC8}" type="datetimeFigureOut">
               <a:rPr lang="en-TR" smtClean="0"/>
-              <a:t>13.11.2023</a:t>
+              <a:t>14.11.2023</a:t>
             </a:fld>
             <a:endParaRPr lang="en-TR"/>
           </a:p>
@@ -2611,7 +2696,7 @@
           <a:p>
             <a:fld id="{9103C8AC-F847-6148-BF1E-A1B65C7CDFC8}" type="datetimeFigureOut">
               <a:rPr lang="en-TR" smtClean="0"/>
-              <a:t>13.11.2023</a:t>
+              <a:t>14.11.2023</a:t>
             </a:fld>
             <a:endParaRPr lang="en-TR"/>
           </a:p>
@@ -3026,7 +3111,7 @@
           <a:p>
             <a:fld id="{9103C8AC-F847-6148-BF1E-A1B65C7CDFC8}" type="datetimeFigureOut">
               <a:rPr lang="en-TR" smtClean="0"/>
-              <a:t>13.11.2023</a:t>
+              <a:t>14.11.2023</a:t>
             </a:fld>
             <a:endParaRPr lang="en-TR"/>
           </a:p>
@@ -3168,7 +3253,7 @@
           <a:p>
             <a:fld id="{9103C8AC-F847-6148-BF1E-A1B65C7CDFC8}" type="datetimeFigureOut">
               <a:rPr lang="en-TR" smtClean="0"/>
-              <a:t>13.11.2023</a:t>
+              <a:t>14.11.2023</a:t>
             </a:fld>
             <a:endParaRPr lang="en-TR"/>
           </a:p>
@@ -3281,7 +3366,7 @@
           <a:p>
             <a:fld id="{9103C8AC-F847-6148-BF1E-A1B65C7CDFC8}" type="datetimeFigureOut">
               <a:rPr lang="en-TR" smtClean="0"/>
-              <a:t>13.11.2023</a:t>
+              <a:t>14.11.2023</a:t>
             </a:fld>
             <a:endParaRPr lang="en-TR"/>
           </a:p>
@@ -3594,7 +3679,7 @@
           <a:p>
             <a:fld id="{9103C8AC-F847-6148-BF1E-A1B65C7CDFC8}" type="datetimeFigureOut">
               <a:rPr lang="en-TR" smtClean="0"/>
-              <a:t>13.11.2023</a:t>
+              <a:t>14.11.2023</a:t>
             </a:fld>
             <a:endParaRPr lang="en-TR"/>
           </a:p>
@@ -3883,7 +3968,7 @@
           <a:p>
             <a:fld id="{9103C8AC-F847-6148-BF1E-A1B65C7CDFC8}" type="datetimeFigureOut">
               <a:rPr lang="en-TR" smtClean="0"/>
-              <a:t>13.11.2023</a:t>
+              <a:t>14.11.2023</a:t>
             </a:fld>
             <a:endParaRPr lang="en-TR"/>
           </a:p>
@@ -4126,7 +4211,7 @@
           <a:p>
             <a:fld id="{9103C8AC-F847-6148-BF1E-A1B65C7CDFC8}" type="datetimeFigureOut">
               <a:rPr lang="en-TR" smtClean="0"/>
-              <a:t>13.11.2023</a:t>
+              <a:t>14.11.2023</a:t>
             </a:fld>
             <a:endParaRPr lang="en-TR"/>
           </a:p>
@@ -5543,6 +5628,666 @@
           <a:p>
             <a:pPr algn="ctr"/>
             <a:r>
+              <a:rPr lang="tr-TR" sz="2400" b="1" dirty="0" err="1">
+                <a:solidFill>
+                  <a:srgbClr val="8316B5"/>
+                </a:solidFill>
+                <a:ea typeface="Arial" charset="0"/>
+                <a:cs typeface="Arial"/>
+              </a:rPr>
+              <a:t>Neural</a:t>
+            </a:r>
+            <a:r>
+              <a:rPr lang="tr-TR" sz="2400" b="1" dirty="0">
+                <a:solidFill>
+                  <a:srgbClr val="8316B5"/>
+                </a:solidFill>
+                <a:ea typeface="Arial" charset="0"/>
+                <a:cs typeface="Arial"/>
+              </a:rPr>
+              <a:t> Networks </a:t>
+            </a:r>
+            <a:endParaRPr lang="tr-TR" sz="2400" b="1" dirty="0">
+              <a:solidFill>
+                <a:srgbClr val="8316B5"/>
+              </a:solidFill>
+              <a:ea typeface="Arial" charset="0"/>
+              <a:cs typeface="Arial" charset="0"/>
+            </a:endParaRPr>
+          </a:p>
+        </p:txBody>
+      </p:sp>
+      <p:sp>
+        <p:nvSpPr>
+          <p:cNvPr id="3" name="Rectangle 2">
+            <a:extLst>
+              <a:ext uri="{FF2B5EF4-FFF2-40B4-BE49-F238E27FC236}">
+                <a16:creationId xmlns:a16="http://schemas.microsoft.com/office/drawing/2014/main" id="{6E8A6CBE-A11D-5F0E-6A68-3B2B2F5C54BB}"/>
+              </a:ext>
+            </a:extLst>
+          </p:cNvPr>
+          <p:cNvSpPr/>
+          <p:nvPr/>
+        </p:nvSpPr>
+        <p:spPr>
+          <a:xfrm>
+            <a:off x="1219202" y="1510145"/>
+            <a:ext cx="1496290" cy="623455"/>
+          </a:xfrm>
+          <a:prstGeom prst="rect">
+            <a:avLst/>
+          </a:prstGeom>
+        </p:spPr>
+        <p:style>
+          <a:lnRef idx="1">
+            <a:schemeClr val="accent6"/>
+          </a:lnRef>
+          <a:fillRef idx="3">
+            <a:schemeClr val="accent6"/>
+          </a:fillRef>
+          <a:effectRef idx="2">
+            <a:schemeClr val="accent6"/>
+          </a:effectRef>
+          <a:fontRef idx="minor">
+            <a:schemeClr val="lt1"/>
+          </a:fontRef>
+        </p:style>
+        <p:txBody>
+          <a:bodyPr rtlCol="0" anchor="ctr"/>
+          <a:lstStyle/>
+          <a:p>
+            <a:pPr algn="ctr"/>
+            <a:r>
+              <a:rPr lang="en-TR" dirty="0"/>
+              <a:t>Feature Extraction</a:t>
+            </a:r>
+          </a:p>
+        </p:txBody>
+      </p:sp>
+      <p:sp>
+        <p:nvSpPr>
+          <p:cNvPr id="6" name="Rectangle 5">
+            <a:extLst>
+              <a:ext uri="{FF2B5EF4-FFF2-40B4-BE49-F238E27FC236}">
+                <a16:creationId xmlns:a16="http://schemas.microsoft.com/office/drawing/2014/main" id="{E0F6E4E8-011F-1218-DBA8-9391661B84AA}"/>
+              </a:ext>
+            </a:extLst>
+          </p:cNvPr>
+          <p:cNvSpPr/>
+          <p:nvPr/>
+        </p:nvSpPr>
+        <p:spPr>
+          <a:xfrm>
+            <a:off x="1219201" y="3429000"/>
+            <a:ext cx="1496290" cy="623455"/>
+          </a:xfrm>
+          <a:prstGeom prst="rect">
+            <a:avLst/>
+          </a:prstGeom>
+        </p:spPr>
+        <p:style>
+          <a:lnRef idx="1">
+            <a:schemeClr val="accent5"/>
+          </a:lnRef>
+          <a:fillRef idx="3">
+            <a:schemeClr val="accent5"/>
+          </a:fillRef>
+          <a:effectRef idx="2">
+            <a:schemeClr val="accent5"/>
+          </a:effectRef>
+          <a:fontRef idx="minor">
+            <a:schemeClr val="lt1"/>
+          </a:fontRef>
+        </p:style>
+        <p:txBody>
+          <a:bodyPr rtlCol="0" anchor="ctr"/>
+          <a:lstStyle/>
+          <a:p>
+            <a:pPr algn="ctr"/>
+            <a:r>
+              <a:rPr lang="en-TR" dirty="0"/>
+              <a:t>Low Level Features</a:t>
+            </a:r>
+          </a:p>
+        </p:txBody>
+      </p:sp>
+      <p:sp>
+        <p:nvSpPr>
+          <p:cNvPr id="7" name="Rectangle 6">
+            <a:extLst>
+              <a:ext uri="{FF2B5EF4-FFF2-40B4-BE49-F238E27FC236}">
+                <a16:creationId xmlns:a16="http://schemas.microsoft.com/office/drawing/2014/main" id="{4668E3F4-F922-1B6D-70C5-42D1004512E3}"/>
+              </a:ext>
+            </a:extLst>
+          </p:cNvPr>
+          <p:cNvSpPr/>
+          <p:nvPr/>
+        </p:nvSpPr>
+        <p:spPr>
+          <a:xfrm>
+            <a:off x="3407166" y="3429000"/>
+            <a:ext cx="1496290" cy="623455"/>
+          </a:xfrm>
+          <a:prstGeom prst="rect">
+            <a:avLst/>
+          </a:prstGeom>
+        </p:spPr>
+        <p:style>
+          <a:lnRef idx="1">
+            <a:schemeClr val="accent5"/>
+          </a:lnRef>
+          <a:fillRef idx="3">
+            <a:schemeClr val="accent5"/>
+          </a:fillRef>
+          <a:effectRef idx="2">
+            <a:schemeClr val="accent5"/>
+          </a:effectRef>
+          <a:fontRef idx="minor">
+            <a:schemeClr val="lt1"/>
+          </a:fontRef>
+        </p:style>
+        <p:txBody>
+          <a:bodyPr rtlCol="0" anchor="ctr"/>
+          <a:lstStyle/>
+          <a:p>
+            <a:pPr algn="ctr"/>
+            <a:r>
+              <a:rPr lang="en-TR" dirty="0"/>
+              <a:t>Mid Level Features</a:t>
+            </a:r>
+          </a:p>
+        </p:txBody>
+      </p:sp>
+      <p:sp>
+        <p:nvSpPr>
+          <p:cNvPr id="9" name="Rectangle 8">
+            <a:extLst>
+              <a:ext uri="{FF2B5EF4-FFF2-40B4-BE49-F238E27FC236}">
+                <a16:creationId xmlns:a16="http://schemas.microsoft.com/office/drawing/2014/main" id="{3987B975-E8FB-1536-83DF-6907FA00A1C4}"/>
+              </a:ext>
+            </a:extLst>
+          </p:cNvPr>
+          <p:cNvSpPr/>
+          <p:nvPr/>
+        </p:nvSpPr>
+        <p:spPr>
+          <a:xfrm>
+            <a:off x="5595131" y="3449782"/>
+            <a:ext cx="1496290" cy="623455"/>
+          </a:xfrm>
+          <a:prstGeom prst="rect">
+            <a:avLst/>
+          </a:prstGeom>
+        </p:spPr>
+        <p:style>
+          <a:lnRef idx="1">
+            <a:schemeClr val="accent5"/>
+          </a:lnRef>
+          <a:fillRef idx="3">
+            <a:schemeClr val="accent5"/>
+          </a:fillRef>
+          <a:effectRef idx="2">
+            <a:schemeClr val="accent5"/>
+          </a:effectRef>
+          <a:fontRef idx="minor">
+            <a:schemeClr val="lt1"/>
+          </a:fontRef>
+        </p:style>
+        <p:txBody>
+          <a:bodyPr rtlCol="0" anchor="ctr"/>
+          <a:lstStyle/>
+          <a:p>
+            <a:pPr algn="ctr"/>
+            <a:r>
+              <a:rPr lang="en-TR" dirty="0"/>
+              <a:t>High Level Features</a:t>
+            </a:r>
+          </a:p>
+        </p:txBody>
+      </p:sp>
+      <p:sp>
+        <p:nvSpPr>
+          <p:cNvPr id="10" name="Rectangle 9">
+            <a:extLst>
+              <a:ext uri="{FF2B5EF4-FFF2-40B4-BE49-F238E27FC236}">
+                <a16:creationId xmlns:a16="http://schemas.microsoft.com/office/drawing/2014/main" id="{B47C65E9-4F78-7169-6381-8733FDDA2D2C}"/>
+              </a:ext>
+            </a:extLst>
+          </p:cNvPr>
+          <p:cNvSpPr/>
+          <p:nvPr/>
+        </p:nvSpPr>
+        <p:spPr>
+          <a:xfrm>
+            <a:off x="7783096" y="3449782"/>
+            <a:ext cx="1496290" cy="623455"/>
+          </a:xfrm>
+          <a:prstGeom prst="rect">
+            <a:avLst/>
+          </a:prstGeom>
+        </p:spPr>
+        <p:style>
+          <a:lnRef idx="1">
+            <a:schemeClr val="accent5"/>
+          </a:lnRef>
+          <a:fillRef idx="3">
+            <a:schemeClr val="accent5"/>
+          </a:fillRef>
+          <a:effectRef idx="2">
+            <a:schemeClr val="accent5"/>
+          </a:effectRef>
+          <a:fontRef idx="minor">
+            <a:schemeClr val="lt1"/>
+          </a:fontRef>
+        </p:style>
+        <p:txBody>
+          <a:bodyPr rtlCol="0" anchor="ctr"/>
+          <a:lstStyle/>
+          <a:p>
+            <a:pPr algn="ctr"/>
+            <a:r>
+              <a:rPr lang="en-TR" dirty="0"/>
+              <a:t>Trainable Classifier</a:t>
+            </a:r>
+          </a:p>
+        </p:txBody>
+      </p:sp>
+      <p:sp>
+        <p:nvSpPr>
+          <p:cNvPr id="11" name="Rectangle 10">
+            <a:extLst>
+              <a:ext uri="{FF2B5EF4-FFF2-40B4-BE49-F238E27FC236}">
+                <a16:creationId xmlns:a16="http://schemas.microsoft.com/office/drawing/2014/main" id="{C4E210AF-E8B8-A79F-2FFA-F110368F50D9}"/>
+              </a:ext>
+            </a:extLst>
+          </p:cNvPr>
+          <p:cNvSpPr/>
+          <p:nvPr/>
+        </p:nvSpPr>
+        <p:spPr>
+          <a:xfrm>
+            <a:off x="7783096" y="1510145"/>
+            <a:ext cx="1496290" cy="623455"/>
+          </a:xfrm>
+          <a:prstGeom prst="rect">
+            <a:avLst/>
+          </a:prstGeom>
+        </p:spPr>
+        <p:style>
+          <a:lnRef idx="1">
+            <a:schemeClr val="accent5"/>
+          </a:lnRef>
+          <a:fillRef idx="3">
+            <a:schemeClr val="accent5"/>
+          </a:fillRef>
+          <a:effectRef idx="2">
+            <a:schemeClr val="accent5"/>
+          </a:effectRef>
+          <a:fontRef idx="minor">
+            <a:schemeClr val="lt1"/>
+          </a:fontRef>
+        </p:style>
+        <p:txBody>
+          <a:bodyPr rtlCol="0" anchor="ctr"/>
+          <a:lstStyle/>
+          <a:p>
+            <a:pPr algn="ctr"/>
+            <a:r>
+              <a:rPr lang="en-TR" dirty="0"/>
+              <a:t>Trainable Classifier</a:t>
+            </a:r>
+          </a:p>
+        </p:txBody>
+      </p:sp>
+      <p:sp>
+        <p:nvSpPr>
+          <p:cNvPr id="12" name="Right Arrow 11">
+            <a:extLst>
+              <a:ext uri="{FF2B5EF4-FFF2-40B4-BE49-F238E27FC236}">
+                <a16:creationId xmlns:a16="http://schemas.microsoft.com/office/drawing/2014/main" id="{2FA4B9FB-45FE-143E-5E0F-69CD21EFC8E7}"/>
+              </a:ext>
+            </a:extLst>
+          </p:cNvPr>
+          <p:cNvSpPr/>
+          <p:nvPr/>
+        </p:nvSpPr>
+        <p:spPr>
+          <a:xfrm>
+            <a:off x="3144982" y="1704109"/>
+            <a:ext cx="4239491" cy="221673"/>
+          </a:xfrm>
+          <a:prstGeom prst="rightArrow">
+            <a:avLst/>
+          </a:prstGeom>
+        </p:spPr>
+        <p:style>
+          <a:lnRef idx="1">
+            <a:schemeClr val="accent2"/>
+          </a:lnRef>
+          <a:fillRef idx="2">
+            <a:schemeClr val="accent2"/>
+          </a:fillRef>
+          <a:effectRef idx="1">
+            <a:schemeClr val="accent2"/>
+          </a:effectRef>
+          <a:fontRef idx="minor">
+            <a:schemeClr val="dk1"/>
+          </a:fontRef>
+        </p:style>
+        <p:txBody>
+          <a:bodyPr rtlCol="0" anchor="ctr"/>
+          <a:lstStyle/>
+          <a:p>
+            <a:pPr algn="ctr"/>
+            <a:endParaRPr lang="en-TR"/>
+          </a:p>
+        </p:txBody>
+      </p:sp>
+      <p:sp>
+        <p:nvSpPr>
+          <p:cNvPr id="13" name="Right Arrow 12">
+            <a:extLst>
+              <a:ext uri="{FF2B5EF4-FFF2-40B4-BE49-F238E27FC236}">
+                <a16:creationId xmlns:a16="http://schemas.microsoft.com/office/drawing/2014/main" id="{20562123-AB4C-D587-CB15-08C24F0DA210}"/>
+              </a:ext>
+            </a:extLst>
+          </p:cNvPr>
+          <p:cNvSpPr/>
+          <p:nvPr/>
+        </p:nvSpPr>
+        <p:spPr>
+          <a:xfrm>
+            <a:off x="2761490" y="3602182"/>
+            <a:ext cx="599676" cy="221673"/>
+          </a:xfrm>
+          <a:prstGeom prst="rightArrow">
+            <a:avLst/>
+          </a:prstGeom>
+        </p:spPr>
+        <p:style>
+          <a:lnRef idx="1">
+            <a:schemeClr val="accent2"/>
+          </a:lnRef>
+          <a:fillRef idx="2">
+            <a:schemeClr val="accent2"/>
+          </a:fillRef>
+          <a:effectRef idx="1">
+            <a:schemeClr val="accent2"/>
+          </a:effectRef>
+          <a:fontRef idx="minor">
+            <a:schemeClr val="dk1"/>
+          </a:fontRef>
+        </p:style>
+        <p:txBody>
+          <a:bodyPr rtlCol="0" anchor="ctr"/>
+          <a:lstStyle/>
+          <a:p>
+            <a:pPr algn="ctr"/>
+            <a:endParaRPr lang="en-TR"/>
+          </a:p>
+        </p:txBody>
+      </p:sp>
+      <p:sp>
+        <p:nvSpPr>
+          <p:cNvPr id="14" name="Right Arrow 13">
+            <a:extLst>
+              <a:ext uri="{FF2B5EF4-FFF2-40B4-BE49-F238E27FC236}">
+                <a16:creationId xmlns:a16="http://schemas.microsoft.com/office/drawing/2014/main" id="{753331FA-4381-262B-8E00-71BBE026003F}"/>
+              </a:ext>
+            </a:extLst>
+          </p:cNvPr>
+          <p:cNvSpPr/>
+          <p:nvPr/>
+        </p:nvSpPr>
+        <p:spPr>
+          <a:xfrm>
+            <a:off x="4964889" y="3602182"/>
+            <a:ext cx="599676" cy="221673"/>
+          </a:xfrm>
+          <a:prstGeom prst="rightArrow">
+            <a:avLst/>
+          </a:prstGeom>
+        </p:spPr>
+        <p:style>
+          <a:lnRef idx="1">
+            <a:schemeClr val="accent2"/>
+          </a:lnRef>
+          <a:fillRef idx="2">
+            <a:schemeClr val="accent2"/>
+          </a:fillRef>
+          <a:effectRef idx="1">
+            <a:schemeClr val="accent2"/>
+          </a:effectRef>
+          <a:fontRef idx="minor">
+            <a:schemeClr val="dk1"/>
+          </a:fontRef>
+        </p:style>
+        <p:txBody>
+          <a:bodyPr rtlCol="0" anchor="ctr"/>
+          <a:lstStyle/>
+          <a:p>
+            <a:pPr algn="ctr"/>
+            <a:endParaRPr lang="en-TR"/>
+          </a:p>
+        </p:txBody>
+      </p:sp>
+      <p:sp>
+        <p:nvSpPr>
+          <p:cNvPr id="15" name="Right Arrow 14">
+            <a:extLst>
+              <a:ext uri="{FF2B5EF4-FFF2-40B4-BE49-F238E27FC236}">
+                <a16:creationId xmlns:a16="http://schemas.microsoft.com/office/drawing/2014/main" id="{3209CF12-A164-E284-C2A1-AF4E45E701F1}"/>
+              </a:ext>
+            </a:extLst>
+          </p:cNvPr>
+          <p:cNvSpPr/>
+          <p:nvPr/>
+        </p:nvSpPr>
+        <p:spPr>
+          <a:xfrm>
+            <a:off x="7137420" y="3629890"/>
+            <a:ext cx="599676" cy="221673"/>
+          </a:xfrm>
+          <a:prstGeom prst="rightArrow">
+            <a:avLst/>
+          </a:prstGeom>
+        </p:spPr>
+        <p:style>
+          <a:lnRef idx="1">
+            <a:schemeClr val="accent2"/>
+          </a:lnRef>
+          <a:fillRef idx="2">
+            <a:schemeClr val="accent2"/>
+          </a:fillRef>
+          <a:effectRef idx="1">
+            <a:schemeClr val="accent2"/>
+          </a:effectRef>
+          <a:fontRef idx="minor">
+            <a:schemeClr val="dk1"/>
+          </a:fontRef>
+        </p:style>
+        <p:txBody>
+          <a:bodyPr rtlCol="0" anchor="ctr"/>
+          <a:lstStyle/>
+          <a:p>
+            <a:pPr algn="ctr"/>
+            <a:endParaRPr lang="en-TR"/>
+          </a:p>
+        </p:txBody>
+      </p:sp>
+      <p:sp>
+        <p:nvSpPr>
+          <p:cNvPr id="16" name="TextBox 15">
+            <a:extLst>
+              <a:ext uri="{FF2B5EF4-FFF2-40B4-BE49-F238E27FC236}">
+                <a16:creationId xmlns:a16="http://schemas.microsoft.com/office/drawing/2014/main" id="{7AC5E7BE-68BC-AF59-D137-D31908BDEE67}"/>
+              </a:ext>
+            </a:extLst>
+          </p:cNvPr>
+          <p:cNvSpPr txBox="1"/>
+          <p:nvPr/>
+        </p:nvSpPr>
+        <p:spPr>
+          <a:xfrm>
+            <a:off x="10002982" y="1565564"/>
+            <a:ext cx="1528175" cy="369332"/>
+          </a:xfrm>
+          <a:prstGeom prst="rect">
+            <a:avLst/>
+          </a:prstGeom>
+          <a:noFill/>
+        </p:spPr>
+        <p:txBody>
+          <a:bodyPr wrap="none" rtlCol="0">
+            <a:spAutoFit/>
+          </a:bodyPr>
+          <a:lstStyle/>
+          <a:p>
+            <a:r>
+              <a:rPr lang="en-TR" dirty="0"/>
+              <a:t>Traditional ML</a:t>
+            </a:r>
+          </a:p>
+        </p:txBody>
+      </p:sp>
+      <p:sp>
+        <p:nvSpPr>
+          <p:cNvPr id="17" name="TextBox 16">
+            <a:extLst>
+              <a:ext uri="{FF2B5EF4-FFF2-40B4-BE49-F238E27FC236}">
+                <a16:creationId xmlns:a16="http://schemas.microsoft.com/office/drawing/2014/main" id="{3F3C887D-F2FE-323B-9211-ED8161D62C3D}"/>
+              </a:ext>
+            </a:extLst>
+          </p:cNvPr>
+          <p:cNvSpPr txBox="1"/>
+          <p:nvPr/>
+        </p:nvSpPr>
+        <p:spPr>
+          <a:xfrm>
+            <a:off x="10002982" y="3496085"/>
+            <a:ext cx="1542410" cy="369332"/>
+          </a:xfrm>
+          <a:prstGeom prst="rect">
+            <a:avLst/>
+          </a:prstGeom>
+          <a:noFill/>
+        </p:spPr>
+        <p:txBody>
+          <a:bodyPr wrap="none" rtlCol="0">
+            <a:spAutoFit/>
+          </a:bodyPr>
+          <a:lstStyle/>
+          <a:p>
+            <a:r>
+              <a:rPr lang="en-TR" dirty="0"/>
+              <a:t>Deep Learning</a:t>
+            </a:r>
+          </a:p>
+        </p:txBody>
+      </p:sp>
+    </p:spTree>
+    <p:extLst>
+      <p:ext uri="{BB962C8B-B14F-4D97-AF65-F5344CB8AC3E}">
+        <p14:creationId xmlns:p14="http://schemas.microsoft.com/office/powerpoint/2010/main" val="2970837558"/>
+      </p:ext>
+    </p:extLst>
+  </p:cSld>
+  <p:clrMapOvr>
+    <a:masterClrMapping/>
+  </p:clrMapOvr>
+</p:sld>
+</file>
+
+<file path=ppt/slides/slide7.xml><?xml version="1.0" encoding="utf-8"?>
+<p:sld xmlns:a="http://schemas.openxmlformats.org/drawingml/2006/main" xmlns:r="http://schemas.openxmlformats.org/officeDocument/2006/relationships" xmlns:p="http://schemas.openxmlformats.org/presentationml/2006/main">
+  <p:cSld>
+    <p:spTree>
+      <p:nvGrpSpPr>
+        <p:cNvPr id="1" name=""/>
+        <p:cNvGrpSpPr/>
+        <p:nvPr/>
+      </p:nvGrpSpPr>
+      <p:grpSpPr>
+        <a:xfrm>
+          <a:off x="0" y="0"/>
+          <a:ext cx="0" cy="0"/>
+          <a:chOff x="0" y="0"/>
+          <a:chExt cx="0" cy="0"/>
+        </a:xfrm>
+      </p:grpSpPr>
+      <p:sp>
+        <p:nvSpPr>
+          <p:cNvPr id="5" name="Rectangle 4"/>
+          <p:cNvSpPr/>
+          <p:nvPr/>
+        </p:nvSpPr>
+        <p:spPr>
+          <a:xfrm>
+            <a:off x="4155311" y="0"/>
+            <a:ext cx="3865945" cy="81023"/>
+          </a:xfrm>
+          <a:prstGeom prst="rect">
+            <a:avLst/>
+          </a:prstGeom>
+          <a:solidFill>
+            <a:srgbClr val="8316B5"/>
+          </a:solidFill>
+          <a:ln>
+            <a:noFill/>
+          </a:ln>
+        </p:spPr>
+        <p:style>
+          <a:lnRef idx="2">
+            <a:schemeClr val="accent1">
+              <a:shade val="50000"/>
+            </a:schemeClr>
+          </a:lnRef>
+          <a:fillRef idx="1">
+            <a:schemeClr val="accent1"/>
+          </a:fillRef>
+          <a:effectRef idx="0">
+            <a:schemeClr val="accent1"/>
+          </a:effectRef>
+          <a:fontRef idx="minor">
+            <a:schemeClr val="lt1"/>
+          </a:fontRef>
+        </p:style>
+        <p:txBody>
+          <a:bodyPr rtlCol="0" anchor="ctr"/>
+          <a:lstStyle/>
+          <a:p>
+            <a:endParaRPr lang="en-US">
+              <a:solidFill>
+                <a:srgbClr val="8316B5"/>
+              </a:solidFill>
+            </a:endParaRPr>
+          </a:p>
+        </p:txBody>
+      </p:sp>
+      <p:sp>
+        <p:nvSpPr>
+          <p:cNvPr id="2" name="TextBox 1"/>
+          <p:cNvSpPr txBox="1"/>
+          <p:nvPr/>
+        </p:nvSpPr>
+        <p:spPr>
+          <a:xfrm>
+            <a:off x="4052337" y="80688"/>
+            <a:ext cx="4081938" cy="461665"/>
+          </a:xfrm>
+          <a:prstGeom prst="rect">
+            <a:avLst/>
+          </a:prstGeom>
+          <a:noFill/>
+        </p:spPr>
+        <p:txBody>
+          <a:bodyPr wrap="square" lIns="91440" tIns="45720" rIns="91440" bIns="45720" rtlCol="0" anchor="t">
+            <a:spAutoFit/>
+          </a:bodyPr>
+          <a:lstStyle/>
+          <a:p>
+            <a:pPr algn="ctr"/>
+            <a:r>
               <a:rPr lang="tr-TR" sz="2400" b="1" dirty="0">
                 <a:solidFill>
                   <a:srgbClr val="8316B5"/>
@@ -5577,7 +6322,7 @@
         <p:spPr>
           <a:xfrm>
             <a:off x="5376672" y="2414016"/>
-            <a:ext cx="1164421" cy="461665"/>
+            <a:ext cx="1583832" cy="1200329"/>
           </a:xfrm>
           <a:prstGeom prst="rect">
             <a:avLst/>
@@ -5590,9 +6335,21 @@
           </a:bodyPr>
           <a:lstStyle/>
           <a:p>
+            <a:pPr algn="ctr"/>
             <a:r>
               <a:rPr lang="en-TR" sz="2400" dirty="0"/>
               <a:t>Thanks!</a:t>
+            </a:r>
+          </a:p>
+          <a:p>
+            <a:pPr algn="ctr"/>
+            <a:endParaRPr lang="en-TR" sz="2400" dirty="0"/>
+          </a:p>
+          <a:p>
+            <a:pPr algn="ctr"/>
+            <a:r>
+              <a:rPr lang="en-TR" sz="2400" dirty="0"/>
+              <a:t>Questions?</a:t>
             </a:r>
           </a:p>
         </p:txBody>

</xml_diff>